<commit_message>
Edits to dial plots update powerpoint
</commit_message>
<xml_diff>
--- a/sampexlib/Concept Summaries/Dial Plots Update.pptx
+++ b/sampexlib/Concept Summaries/Dial Plots Update.pptx
@@ -107,6 +107,11 @@
       </a:defRPr>
     </a:lvl9pPr>
   </p:defaultTextStyle>
+  <p:extLst>
+    <p:ext uri="{EFAFB233-063F-42B5-8137-9DF3F51BA10A}">
+      <p15:sldGuideLst xmlns:p15="http://schemas.microsoft.com/office/powerpoint/2012/main"/>
+    </p:ext>
+  </p:extLst>
 </p:presentation>
 </file>
 
@@ -3492,8 +3497,8 @@
         </p:blipFill>
         <p:spPr bwMode="auto">
           <a:xfrm>
-            <a:off x="1925791" y="2465033"/>
-            <a:ext cx="4256386" cy="4571753"/>
+            <a:off x="2629836" y="1379779"/>
+            <a:ext cx="2446268" cy="2627519"/>
           </a:xfrm>
           <a:prstGeom prst="rect">
             <a:avLst/>
@@ -3631,8 +3636,8 @@
         </p:blipFill>
         <p:spPr>
           <a:xfrm>
-            <a:off x="6421018" y="2476129"/>
-            <a:ext cx="4711580" cy="5060141"/>
+            <a:off x="5728020" y="1379779"/>
+            <a:ext cx="2446521" cy="2627513"/>
           </a:xfrm>
           <a:prstGeom prst="rect">
             <a:avLst/>
@@ -3892,6 +3897,99 @@
           </a:p>
         </p:txBody>
       </p:sp>
+      <p:pic>
+        <p:nvPicPr>
+          <p:cNvPr id="10" name="Picture 4">
+            <a:extLst>
+              <a:ext uri="{FF2B5EF4-FFF2-40B4-BE49-F238E27FC236}">
+                <a16:creationId xmlns:a16="http://schemas.microsoft.com/office/drawing/2014/main" id="{980E11CE-C993-4B4F-BFCF-695BA25E45E4}"/>
+              </a:ext>
+            </a:extLst>
+          </p:cNvPr>
+          <p:cNvPicPr>
+            <a:picLocks noChangeAspect="1" noChangeArrowheads="1"/>
+          </p:cNvPicPr>
+          <p:nvPr/>
+        </p:nvPicPr>
+        <p:blipFill>
+          <a:blip r:embed="rId4">
+            <a:extLst>
+              <a:ext uri="{28A0092B-C50C-407E-A947-70E740481C1C}">
+                <a14:useLocalDpi xmlns:a14="http://schemas.microsoft.com/office/drawing/2010/main" val="0"/>
+              </a:ext>
+            </a:extLst>
+          </a:blip>
+          <a:srcRect/>
+          <a:stretch>
+            <a:fillRect/>
+          </a:stretch>
+        </p:blipFill>
+        <p:spPr bwMode="auto">
+          <a:xfrm>
+            <a:off x="2626698" y="4163225"/>
+            <a:ext cx="2446268" cy="2630788"/>
+          </a:xfrm>
+          <a:prstGeom prst="rect">
+            <a:avLst/>
+          </a:prstGeom>
+          <a:noFill/>
+          <a:ln w="19050">
+            <a:solidFill>
+              <a:schemeClr val="tx1"/>
+            </a:solidFill>
+          </a:ln>
+          <a:extLst>
+            <a:ext uri="{909E8E84-426E-40DD-AFC4-6F175D3DCCD1}">
+              <a14:hiddenFill xmlns:a14="http://schemas.microsoft.com/office/drawing/2010/main">
+                <a:solidFill>
+                  <a:srgbClr val="FFFFFF"/>
+                </a:solidFill>
+              </a14:hiddenFill>
+            </a:ext>
+          </a:extLst>
+        </p:spPr>
+      </p:pic>
+      <p:pic>
+        <p:nvPicPr>
+          <p:cNvPr id="6" name="Picture 5">
+            <a:extLst>
+              <a:ext uri="{FF2B5EF4-FFF2-40B4-BE49-F238E27FC236}">
+                <a16:creationId xmlns:a16="http://schemas.microsoft.com/office/drawing/2014/main" id="{59DE6DCB-44A7-433E-A156-6E95C7328A57}"/>
+              </a:ext>
+            </a:extLst>
+          </p:cNvPr>
+          <p:cNvPicPr>
+            <a:picLocks noChangeAspect="1"/>
+          </p:cNvPicPr>
+          <p:nvPr/>
+        </p:nvPicPr>
+        <p:blipFill>
+          <a:blip r:embed="rId5">
+            <a:extLst>
+              <a:ext uri="{28A0092B-C50C-407E-A947-70E740481C1C}">
+                <a14:useLocalDpi xmlns:a14="http://schemas.microsoft.com/office/drawing/2010/main" val="0"/>
+              </a:ext>
+            </a:extLst>
+          </a:blip>
+          <a:stretch>
+            <a:fillRect/>
+          </a:stretch>
+        </p:blipFill>
+        <p:spPr>
+          <a:xfrm>
+            <a:off x="5728020" y="4162826"/>
+            <a:ext cx="2449571" cy="2630789"/>
+          </a:xfrm>
+          <a:prstGeom prst="rect">
+            <a:avLst/>
+          </a:prstGeom>
+          <a:ln w="19050">
+            <a:solidFill>
+              <a:schemeClr val="tx1"/>
+            </a:solidFill>
+          </a:ln>
+        </p:spPr>
+      </p:pic>
     </p:spTree>
     <p:extLst>
       <p:ext uri="{BB962C8B-B14F-4D97-AF65-F5344CB8AC3E}">

</xml_diff>

<commit_message>
Created new iso vs MLT plots
</commit_message>
<xml_diff>
--- a/sampexlib/Concept Summaries/Dial Plots Update.pptx
+++ b/sampexlib/Concept Summaries/Dial Plots Update.pptx
@@ -262,7 +262,7 @@
           <a:p>
             <a:fld id="{26F43DFC-5143-4B10-84C4-EEBDD616239F}" type="datetimeFigureOut">
               <a:rPr lang="en-US" smtClean="0"/>
-              <a:t>9/30/2021</a:t>
+              <a:t>10/6/2021</a:t>
             </a:fld>
             <a:endParaRPr lang="en-US"/>
           </a:p>
@@ -460,7 +460,7 @@
           <a:p>
             <a:fld id="{26F43DFC-5143-4B10-84C4-EEBDD616239F}" type="datetimeFigureOut">
               <a:rPr lang="en-US" smtClean="0"/>
-              <a:t>9/30/2021</a:t>
+              <a:t>10/6/2021</a:t>
             </a:fld>
             <a:endParaRPr lang="en-US"/>
           </a:p>
@@ -668,7 +668,7 @@
           <a:p>
             <a:fld id="{26F43DFC-5143-4B10-84C4-EEBDD616239F}" type="datetimeFigureOut">
               <a:rPr lang="en-US" smtClean="0"/>
-              <a:t>9/30/2021</a:t>
+              <a:t>10/6/2021</a:t>
             </a:fld>
             <a:endParaRPr lang="en-US"/>
           </a:p>
@@ -866,7 +866,7 @@
           <a:p>
             <a:fld id="{26F43DFC-5143-4B10-84C4-EEBDD616239F}" type="datetimeFigureOut">
               <a:rPr lang="en-US" smtClean="0"/>
-              <a:t>9/30/2021</a:t>
+              <a:t>10/6/2021</a:t>
             </a:fld>
             <a:endParaRPr lang="en-US"/>
           </a:p>
@@ -1141,7 +1141,7 @@
           <a:p>
             <a:fld id="{26F43DFC-5143-4B10-84C4-EEBDD616239F}" type="datetimeFigureOut">
               <a:rPr lang="en-US" smtClean="0"/>
-              <a:t>9/30/2021</a:t>
+              <a:t>10/6/2021</a:t>
             </a:fld>
             <a:endParaRPr lang="en-US"/>
           </a:p>
@@ -1406,7 +1406,7 @@
           <a:p>
             <a:fld id="{26F43DFC-5143-4B10-84C4-EEBDD616239F}" type="datetimeFigureOut">
               <a:rPr lang="en-US" smtClean="0"/>
-              <a:t>9/30/2021</a:t>
+              <a:t>10/6/2021</a:t>
             </a:fld>
             <a:endParaRPr lang="en-US"/>
           </a:p>
@@ -1818,7 +1818,7 @@
           <a:p>
             <a:fld id="{26F43DFC-5143-4B10-84C4-EEBDD616239F}" type="datetimeFigureOut">
               <a:rPr lang="en-US" smtClean="0"/>
-              <a:t>9/30/2021</a:t>
+              <a:t>10/6/2021</a:t>
             </a:fld>
             <a:endParaRPr lang="en-US"/>
           </a:p>
@@ -1959,7 +1959,7 @@
           <a:p>
             <a:fld id="{26F43DFC-5143-4B10-84C4-EEBDD616239F}" type="datetimeFigureOut">
               <a:rPr lang="en-US" smtClean="0"/>
-              <a:t>9/30/2021</a:t>
+              <a:t>10/6/2021</a:t>
             </a:fld>
             <a:endParaRPr lang="en-US"/>
           </a:p>
@@ -2072,7 +2072,7 @@
           <a:p>
             <a:fld id="{26F43DFC-5143-4B10-84C4-EEBDD616239F}" type="datetimeFigureOut">
               <a:rPr lang="en-US" smtClean="0"/>
-              <a:t>9/30/2021</a:t>
+              <a:t>10/6/2021</a:t>
             </a:fld>
             <a:endParaRPr lang="en-US"/>
           </a:p>
@@ -2383,7 +2383,7 @@
           <a:p>
             <a:fld id="{26F43DFC-5143-4B10-84C4-EEBDD616239F}" type="datetimeFigureOut">
               <a:rPr lang="en-US" smtClean="0"/>
-              <a:t>9/30/2021</a:t>
+              <a:t>10/6/2021</a:t>
             </a:fld>
             <a:endParaRPr lang="en-US"/>
           </a:p>
@@ -2671,7 +2671,7 @@
           <a:p>
             <a:fld id="{26F43DFC-5143-4B10-84C4-EEBDD616239F}" type="datetimeFigureOut">
               <a:rPr lang="en-US" smtClean="0"/>
-              <a:t>9/30/2021</a:t>
+              <a:t>10/6/2021</a:t>
             </a:fld>
             <a:endParaRPr lang="en-US"/>
           </a:p>
@@ -2912,7 +2912,7 @@
           <a:p>
             <a:fld id="{26F43DFC-5143-4B10-84C4-EEBDD616239F}" type="datetimeFigureOut">
               <a:rPr lang="en-US" smtClean="0"/>
-              <a:t>9/30/2021</a:t>
+              <a:t>10/6/2021</a:t>
             </a:fld>
             <a:endParaRPr lang="en-US"/>
           </a:p>
@@ -5012,7 +5012,7 @@
         <p:spPr>
           <a:xfrm>
             <a:off x="5868139" y="2637094"/>
-            <a:ext cx="4790717" cy="3945698"/>
+            <a:ext cx="4886864" cy="4024886"/>
           </a:xfrm>
           <a:prstGeom prst="rect">
             <a:avLst/>

</xml_diff>